<commit_message>
Added notes to first slide.
</commit_message>
<xml_diff>
--- a/TAPP15-presentation/queries.pptx
+++ b/TAPP15-presentation/queries.pptx
@@ -510,222 +510,38 @@
           <a:p>
             <a:r>
               <a:rPr lang="en-US" dirty="0" smtClean="0"/>
-              <a:t>Query</a:t>
+              <a:t>This is the information we have available to satisfy queries:</a:t>
+            </a:r>
+          </a:p>
+          <a:p>
+            <a:pPr marL="228600" indent="-228600">
+              <a:buAutoNum type="arabicParenBoth"/>
+            </a:pPr>
+            <a:r>
+              <a:rPr lang="en-US" dirty="0" smtClean="0"/>
+              <a:t>The</a:t>
             </a:r>
             <a:r>
               <a:rPr lang="en-US" baseline="0" dirty="0" smtClean="0"/>
-              <a:t> 1:  </a:t>
-            </a:r>
-            <a:r>
-              <a:rPr lang="en-US" b="1" baseline="0" dirty="0" smtClean="0"/>
-              <a:t>What samples </a:t>
+              <a:t> YW annotations and the resulting YW model of the script including URI templates </a:t>
+            </a:r>
+            <a:r>
+              <a:rPr lang="en-US" baseline="0" smtClean="0"/>
+              <a:t>describing any expected </a:t>
             </a:r>
             <a:r>
               <a:rPr lang="en-US" baseline="0" dirty="0" smtClean="0"/>
-              <a:t>did the run of the script </a:t>
-            </a:r>
-            <a:r>
-              <a:rPr lang="en-US" b="1" baseline="0" dirty="0" smtClean="0"/>
-              <a:t>collect</a:t>
-            </a:r>
+              <a:t>outputs (left).</a:t>
+            </a:r>
+          </a:p>
+          <a:p>
+            <a:pPr marL="228600" indent="-228600">
+              <a:buAutoNum type="arabicParenBoth"/>
+            </a:pPr>
             <a:r>
               <a:rPr lang="en-US" baseline="0" dirty="0" smtClean="0"/>
-              <a:t> </a:t>
-            </a:r>
-            <a:r>
-              <a:rPr lang="en-US" b="1" baseline="0" dirty="0" smtClean="0"/>
-              <a:t>images</a:t>
-            </a:r>
-            <a:r>
-              <a:rPr lang="en-US" baseline="0" dirty="0" smtClean="0"/>
-              <a:t> from?</a:t>
-            </a:r>
-          </a:p>
-          <a:p>
-            <a:pPr algn="l"/>
-            <a:r>
-              <a:rPr lang="en-US" baseline="0" dirty="0" smtClean="0"/>
-              <a:t>Scientist:  </a:t>
-            </a:r>
-            <a:r>
-              <a:rPr lang="en-US" sz="1200" kern="1200" baseline="0" dirty="0" smtClean="0">
-                <a:solidFill>
-                  <a:schemeClr val="tx1"/>
-                </a:solidFill>
-                <a:effectLst/>
-                <a:latin typeface="+mn-lt"/>
-                <a:ea typeface="+mn-ea"/>
-                <a:cs typeface="+mn-cs"/>
-              </a:rPr>
-              <a:t>L</a:t>
-            </a:r>
-            <a:r>
-              <a:rPr lang="en-US" sz="1200" kern="1200" dirty="0" smtClean="0">
-                <a:solidFill>
-                  <a:schemeClr val="tx1"/>
-                </a:solidFill>
-                <a:effectLst/>
-                <a:latin typeface="+mn-lt"/>
-                <a:ea typeface="+mn-ea"/>
-                <a:cs typeface="+mn-cs"/>
-              </a:rPr>
-              <a:t>ook at the contents of the run/{}/q55 directories. The names of subdirectories are the names of the samples collected on. </a:t>
-            </a:r>
-          </a:p>
-          <a:p>
-            <a:pPr marL="0" marR="0" indent="0" algn="l" defTabSz="457200" rtl="0" eaLnBrk="1" fontAlgn="auto" latinLnBrk="0" hangingPunct="1">
-              <a:lnSpc>
-                <a:spcPct val="100000"/>
-              </a:lnSpc>
-              <a:spcBef>
-                <a:spcPts val="0"/>
-              </a:spcBef>
-              <a:spcAft>
-                <a:spcPts val="0"/>
-              </a:spcAft>
-              <a:buClrTx/>
-              <a:buSzTx/>
-              <a:buFontTx/>
-              <a:buNone/>
-              <a:tabLst/>
-              <a:defRPr/>
-            </a:pPr>
-            <a:r>
-              <a:rPr lang="en-US" sz="1200" kern="1200" dirty="0" smtClean="0">
-                <a:solidFill>
-                  <a:schemeClr val="tx1"/>
-                </a:solidFill>
-                <a:effectLst/>
-                <a:latin typeface="+mn-lt"/>
-                <a:ea typeface="+mn-ea"/>
-                <a:cs typeface="+mn-cs"/>
-              </a:rPr>
-              <a:t>YW: Return</a:t>
-            </a:r>
-            <a:r>
-              <a:rPr lang="en-US" sz="1200" kern="1200" baseline="0" dirty="0" smtClean="0">
-                <a:solidFill>
-                  <a:schemeClr val="tx1"/>
-                </a:solidFill>
-                <a:effectLst/>
-                <a:latin typeface="+mn-lt"/>
-                <a:ea typeface="+mn-ea"/>
-                <a:cs typeface="+mn-cs"/>
-              </a:rPr>
-              <a:t> </a:t>
-            </a:r>
-            <a:r>
-              <a:rPr lang="en-US" sz="1200" kern="1200" dirty="0" smtClean="0">
-                <a:solidFill>
-                  <a:schemeClr val="tx1"/>
-                </a:solidFill>
-                <a:effectLst/>
-                <a:latin typeface="+mn-lt"/>
-                <a:ea typeface="+mn-ea"/>
-                <a:cs typeface="+mn-cs"/>
-              </a:rPr>
-              <a:t>values of </a:t>
-            </a:r>
-            <a:r>
-              <a:rPr lang="en-US" sz="1200" b="1" kern="1200" dirty="0" err="1" smtClean="0">
-                <a:solidFill>
-                  <a:schemeClr val="tx1"/>
-                </a:solidFill>
-                <a:effectLst/>
-                <a:latin typeface="+mn-lt"/>
-                <a:ea typeface="+mn-ea"/>
-                <a:cs typeface="+mn-cs"/>
-              </a:rPr>
-              <a:t>sample_id</a:t>
-            </a:r>
-            <a:r>
-              <a:rPr lang="en-US" sz="1200" kern="1200" dirty="0" smtClean="0">
-                <a:solidFill>
-                  <a:schemeClr val="tx1"/>
-                </a:solidFill>
-                <a:effectLst/>
-                <a:latin typeface="+mn-lt"/>
-                <a:ea typeface="+mn-ea"/>
-                <a:cs typeface="+mn-cs"/>
-              </a:rPr>
-              <a:t> as seen by </a:t>
-            </a:r>
-            <a:r>
-              <a:rPr lang="en-US" sz="1200" b="1" kern="1200" dirty="0" err="1" smtClean="0">
-                <a:solidFill>
-                  <a:schemeClr val="tx1"/>
-                </a:solidFill>
-                <a:effectLst/>
-                <a:latin typeface="+mn-lt"/>
-                <a:ea typeface="+mn-ea"/>
-                <a:cs typeface="+mn-cs"/>
-              </a:rPr>
-              <a:t>collect_data_set</a:t>
-            </a:r>
-            <a:r>
-              <a:rPr lang="en-US" sz="1200" kern="1200" dirty="0" smtClean="0">
-                <a:solidFill>
-                  <a:schemeClr val="tx1"/>
-                </a:solidFill>
-                <a:effectLst/>
-                <a:latin typeface="+mn-lt"/>
-                <a:ea typeface="+mn-ea"/>
-                <a:cs typeface="+mn-cs"/>
-              </a:rPr>
-              <a:t> and recorded</a:t>
-            </a:r>
-            <a:r>
-              <a:rPr lang="en-US" sz="1200" kern="1200" baseline="0" dirty="0" smtClean="0">
-                <a:solidFill>
-                  <a:schemeClr val="tx1"/>
-                </a:solidFill>
-                <a:effectLst/>
-                <a:latin typeface="+mn-lt"/>
-                <a:ea typeface="+mn-ea"/>
-                <a:cs typeface="+mn-cs"/>
-              </a:rPr>
-              <a:t> in expansions of URI template for </a:t>
-            </a:r>
-            <a:r>
-              <a:rPr lang="en-US" sz="1200" b="1" kern="1200" baseline="0" dirty="0" err="1" smtClean="0">
-                <a:solidFill>
-                  <a:schemeClr val="tx1"/>
-                </a:solidFill>
-                <a:effectLst/>
-                <a:latin typeface="+mn-lt"/>
-                <a:ea typeface="+mn-ea"/>
-                <a:cs typeface="+mn-cs"/>
-              </a:rPr>
-              <a:t>raw_image</a:t>
-            </a:r>
-            <a:r>
-              <a:rPr lang="en-US" sz="1200" kern="1200" baseline="0" dirty="0" smtClean="0">
-                <a:solidFill>
-                  <a:schemeClr val="tx1"/>
-                </a:solidFill>
-                <a:effectLst/>
-                <a:latin typeface="+mn-lt"/>
-                <a:ea typeface="+mn-ea"/>
-                <a:cs typeface="+mn-cs"/>
-              </a:rPr>
-              <a:t>.</a:t>
-            </a:r>
-            <a:r>
-              <a:rPr lang="en-US" sz="1200" kern="1200" dirty="0" smtClean="0">
-                <a:solidFill>
-                  <a:schemeClr val="tx1"/>
-                </a:solidFill>
-                <a:effectLst/>
-                <a:latin typeface="+mn-lt"/>
-                <a:ea typeface="+mn-ea"/>
-                <a:cs typeface="+mn-cs"/>
-              </a:rPr>
-              <a:t> </a:t>
-            </a:r>
-            <a:endParaRPr lang="en-US" dirty="0" smtClean="0"/>
-          </a:p>
-          <a:p>
-            <a:pPr algn="l"/>
+              <a:t>The files and directories actually left by a run of the script (right).</a:t>
+            </a:r>
             <a:endParaRPr lang="en-US" dirty="0"/>
           </a:p>
         </p:txBody>
@@ -747,7 +563,7 @@
           <a:p>
             <a:fld id="{B9A15983-6E63-4C4D-8817-F3F7EA95B8AD}" type="slidenum">
               <a:rPr lang="en-US" smtClean="0"/>
-              <a:t>2</a:t>
+              <a:t>1</a:t>
             </a:fld>
             <a:endParaRPr lang="en-US"/>
           </a:p>
@@ -756,7 +572,7 @@
     </p:spTree>
     <p:extLst>
       <p:ext uri="{BB962C8B-B14F-4D97-AF65-F5344CB8AC3E}">
-        <p14:creationId xmlns:p14="http://schemas.microsoft.com/office/powerpoint/2010/main" val="1022435978"/>
+        <p14:creationId xmlns:p14="http://schemas.microsoft.com/office/powerpoint/2010/main" val="3557604014"/>
       </p:ext>
     </p:extLst>
   </p:cSld>
@@ -810,6 +626,71 @@
           <a:bodyPr/>
           <a:lstStyle/>
           <a:p>
+            <a:r>
+              <a:rPr lang="en-US" dirty="0" smtClean="0"/>
+              <a:t>Query</a:t>
+            </a:r>
+            <a:r>
+              <a:rPr lang="en-US" baseline="0" dirty="0" smtClean="0"/>
+              <a:t> 1:  </a:t>
+            </a:r>
+            <a:r>
+              <a:rPr lang="en-US" b="1" baseline="0" dirty="0" smtClean="0"/>
+              <a:t>What samples </a:t>
+            </a:r>
+            <a:r>
+              <a:rPr lang="en-US" baseline="0" dirty="0" smtClean="0"/>
+              <a:t>did the run of the script </a:t>
+            </a:r>
+            <a:r>
+              <a:rPr lang="en-US" b="1" baseline="0" dirty="0" smtClean="0"/>
+              <a:t>collect</a:t>
+            </a:r>
+            <a:r>
+              <a:rPr lang="en-US" baseline="0" dirty="0" smtClean="0"/>
+              <a:t> </a:t>
+            </a:r>
+            <a:r>
+              <a:rPr lang="en-US" b="1" baseline="0" dirty="0" smtClean="0"/>
+              <a:t>images</a:t>
+            </a:r>
+            <a:r>
+              <a:rPr lang="en-US" baseline="0" dirty="0" smtClean="0"/>
+              <a:t> from?</a:t>
+            </a:r>
+          </a:p>
+          <a:p>
+            <a:pPr algn="l"/>
+            <a:r>
+              <a:rPr lang="en-US" baseline="0" dirty="0" smtClean="0"/>
+              <a:t>Scientist:  </a:t>
+            </a:r>
+            <a:r>
+              <a:rPr lang="en-US" sz="1200" kern="1200" baseline="0" dirty="0" smtClean="0">
+                <a:solidFill>
+                  <a:schemeClr val="tx1"/>
+                </a:solidFill>
+                <a:effectLst/>
+                <a:latin typeface="+mn-lt"/>
+                <a:ea typeface="+mn-ea"/>
+                <a:cs typeface="+mn-cs"/>
+              </a:rPr>
+              <a:t>L</a:t>
+            </a:r>
+            <a:r>
+              <a:rPr lang="en-US" sz="1200" kern="1200" dirty="0" smtClean="0">
+                <a:solidFill>
+                  <a:schemeClr val="tx1"/>
+                </a:solidFill>
+                <a:effectLst/>
+                <a:latin typeface="+mn-lt"/>
+                <a:ea typeface="+mn-ea"/>
+                <a:cs typeface="+mn-cs"/>
+              </a:rPr>
+              <a:t>ook at the contents of the run/{}/q55 directories. The names of subdirectories are the names of the samples collected on. </a:t>
+            </a:r>
+          </a:p>
+          <a:p>
             <a:pPr marL="0" marR="0" indent="0" algn="l" defTabSz="457200" rtl="0" eaLnBrk="1" fontAlgn="auto" latinLnBrk="0" hangingPunct="1">
               <a:lnSpc>
                 <a:spcPct val="100000"/>
@@ -828,19 +709,7 @@
               <a:defRPr/>
             </a:pPr>
             <a:r>
-              <a:rPr lang="en-US" dirty="0" smtClean="0"/>
-              <a:t>Query</a:t>
-            </a:r>
-            <a:r>
-              <a:rPr lang="en-US" baseline="0" dirty="0" smtClean="0"/>
-              <a:t> 2</a:t>
-            </a:r>
-            <a:r>
-              <a:rPr lang="en-US" i="0" baseline="0" dirty="0" smtClean="0"/>
-              <a:t>:  </a:t>
-            </a:r>
-            <a:r>
-              <a:rPr lang="en-US" sz="1200" b="1" i="0" kern="1200" dirty="0" smtClean="0">
+              <a:rPr lang="en-US" sz="1200" kern="1200" dirty="0" smtClean="0">
                 <a:solidFill>
                   <a:schemeClr val="tx1"/>
                 </a:solidFill>
@@ -849,10 +718,10 @@
                 <a:ea typeface="+mn-ea"/>
                 <a:cs typeface="+mn-cs"/>
               </a:rPr>
-              <a:t>What energies </a:t>
-            </a:r>
-            <a:r>
-              <a:rPr lang="en-US" sz="1200" b="0" i="0" kern="1200" dirty="0" smtClean="0">
+              <a:t>YW: Return</a:t>
+            </a:r>
+            <a:r>
+              <a:rPr lang="en-US" sz="1200" kern="1200" baseline="0" dirty="0" smtClean="0">
                 <a:solidFill>
                   <a:schemeClr val="tx1"/>
                 </a:solidFill>
@@ -861,10 +730,10 @@
                 <a:ea typeface="+mn-ea"/>
                 <a:cs typeface="+mn-cs"/>
               </a:rPr>
-              <a:t>were used during </a:t>
-            </a:r>
-            <a:r>
-              <a:rPr lang="en-US" sz="1200" b="1" i="0" kern="1200" dirty="0" smtClean="0">
+              <a:t> </a:t>
+            </a:r>
+            <a:r>
+              <a:rPr lang="en-US" sz="1200" kern="1200" dirty="0" smtClean="0">
                 <a:solidFill>
                   <a:schemeClr val="tx1"/>
                 </a:solidFill>
@@ -873,10 +742,10 @@
                 <a:ea typeface="+mn-ea"/>
                 <a:cs typeface="+mn-cs"/>
               </a:rPr>
-              <a:t>collection</a:t>
-            </a:r>
-            <a:r>
-              <a:rPr lang="en-US" sz="1200" b="0" i="0" kern="1200" dirty="0" smtClean="0">
+              <a:t>values of </a:t>
+            </a:r>
+            <a:r>
+              <a:rPr lang="en-US" sz="1200" b="1" kern="1200" dirty="0" err="1" smtClean="0">
                 <a:solidFill>
                   <a:schemeClr val="tx1"/>
                 </a:solidFill>
@@ -885,10 +754,10 @@
                 <a:ea typeface="+mn-ea"/>
                 <a:cs typeface="+mn-cs"/>
               </a:rPr>
-              <a:t> of images from sample </a:t>
-            </a:r>
-            <a:r>
-              <a:rPr lang="en-US" sz="1200" b="1" i="0" kern="1200" dirty="0" smtClean="0">
+              <a:t>sample_id</a:t>
+            </a:r>
+            <a:r>
+              <a:rPr lang="en-US" sz="1200" kern="1200" dirty="0" smtClean="0">
                 <a:solidFill>
                   <a:schemeClr val="tx1"/>
                 </a:solidFill>
@@ -897,10 +766,10 @@
                 <a:ea typeface="+mn-ea"/>
                 <a:cs typeface="+mn-cs"/>
               </a:rPr>
-              <a:t>DRT322</a:t>
-            </a:r>
-            <a:r>
-              <a:rPr lang="en-US" sz="1200" b="0" i="0" kern="1200" dirty="0" smtClean="0">
+              <a:t> as seen by </a:t>
+            </a:r>
+            <a:r>
+              <a:rPr lang="en-US" sz="1200" b="1" kern="1200" dirty="0" err="1" smtClean="0">
                 <a:solidFill>
                   <a:schemeClr val="tx1"/>
                 </a:solidFill>
@@ -909,14 +778,7 @@
                 <a:ea typeface="+mn-ea"/>
                 <a:cs typeface="+mn-cs"/>
               </a:rPr>
-              <a:t>?</a:t>
-            </a:r>
-            <a:endParaRPr lang="en-US" baseline="0" dirty="0" smtClean="0"/>
-          </a:p>
-          <a:p>
-            <a:r>
-              <a:rPr lang="en-US" baseline="0" dirty="0" smtClean="0"/>
-              <a:t>Scientist:  L</a:t>
+              <a:t>collect_data_set</a:t>
             </a:r>
             <a:r>
               <a:rPr lang="en-US" sz="1200" kern="1200" dirty="0" smtClean="0">
@@ -928,10 +790,10 @@
                 <a:ea typeface="+mn-ea"/>
                 <a:cs typeface="+mn-cs"/>
               </a:rPr>
-              <a:t>ook at the contents of the run/raw/q55/</a:t>
-            </a:r>
-            <a:r>
-              <a:rPr lang="en-US" sz="1200" b="1" kern="1200" dirty="0" smtClean="0">
+              <a:t> and recorded</a:t>
+            </a:r>
+            <a:r>
+              <a:rPr lang="en-US" sz="1200" kern="1200" baseline="0" dirty="0" smtClean="0">
                 <a:solidFill>
                   <a:schemeClr val="tx1"/>
                 </a:solidFill>
@@ -940,10 +802,10 @@
                 <a:ea typeface="+mn-ea"/>
                 <a:cs typeface="+mn-cs"/>
               </a:rPr>
-              <a:t>DRT322</a:t>
-            </a:r>
-            <a:r>
-              <a:rPr lang="en-US" sz="1200" kern="1200" dirty="0" smtClean="0">
+              <a:t> in expansions of URI template for </a:t>
+            </a:r>
+            <a:r>
+              <a:rPr lang="en-US" sz="1200" b="1" kern="1200" baseline="0" dirty="0" err="1" smtClean="0">
                 <a:solidFill>
                   <a:schemeClr val="tx1"/>
                 </a:solidFill>
@@ -952,30 +814,10 @@
                 <a:ea typeface="+mn-ea"/>
                 <a:cs typeface="+mn-cs"/>
               </a:rPr>
-              <a:t> directory. The names of subdirectories indicate the values of the energies.</a:t>
-            </a:r>
-            <a:endParaRPr lang="en-US" dirty="0" smtClean="0"/>
-          </a:p>
-          <a:p>
-            <a:pPr marL="0" marR="0" indent="0" algn="l" defTabSz="457200" rtl="0" eaLnBrk="1" fontAlgn="auto" latinLnBrk="0" hangingPunct="1">
-              <a:lnSpc>
-                <a:spcPct val="100000"/>
-              </a:lnSpc>
-              <a:spcBef>
-                <a:spcPts val="0"/>
-              </a:spcBef>
-              <a:spcAft>
-                <a:spcPts val="0"/>
-              </a:spcAft>
-              <a:buClrTx/>
-              <a:buSzTx/>
-              <a:buFontTx/>
-              <a:buNone/>
-              <a:tabLst/>
-              <a:defRPr/>
-            </a:pPr>
-            <a:r>
-              <a:rPr lang="en-US" sz="1200" kern="1200" dirty="0" smtClean="0">
+              <a:t>raw_image</a:t>
+            </a:r>
+            <a:r>
+              <a:rPr lang="en-US" sz="1200" kern="1200" baseline="0" dirty="0" smtClean="0">
                 <a:solidFill>
                   <a:schemeClr val="tx1"/>
                 </a:solidFill>
@@ -984,10 +826,10 @@
                 <a:ea typeface="+mn-ea"/>
                 <a:cs typeface="+mn-cs"/>
               </a:rPr>
-              <a:t>YW: look for all persisted outputs of </a:t>
-            </a:r>
-            <a:r>
-              <a:rPr lang="en-US" sz="1200" b="1" kern="1200" dirty="0" err="1" smtClean="0">
+              <a:t>.</a:t>
+            </a:r>
+            <a:r>
+              <a:rPr lang="en-US" sz="1200" kern="1200" dirty="0" smtClean="0">
                 <a:solidFill>
                   <a:schemeClr val="tx1"/>
                 </a:solidFill>
@@ -996,127 +838,7 @@
                 <a:ea typeface="+mn-ea"/>
                 <a:cs typeface="+mn-cs"/>
               </a:rPr>
-              <a:t>collect_data_set</a:t>
-            </a:r>
-            <a:r>
-              <a:rPr lang="en-US" sz="1200" kern="1200" dirty="0" smtClean="0">
-                <a:solidFill>
-                  <a:schemeClr val="tx1"/>
-                </a:solidFill>
-                <a:effectLst/>
-                <a:latin typeface="+mn-lt"/>
-                <a:ea typeface="+mn-ea"/>
-                <a:cs typeface="+mn-cs"/>
-              </a:rPr>
-              <a:t> that include both </a:t>
-            </a:r>
-            <a:r>
-              <a:rPr lang="en-US" sz="1200" b="1" kern="1200" dirty="0" smtClean="0">
-                <a:solidFill>
-                  <a:schemeClr val="tx1"/>
-                </a:solidFill>
-                <a:effectLst/>
-                <a:latin typeface="+mn-lt"/>
-                <a:ea typeface="+mn-ea"/>
-                <a:cs typeface="+mn-cs"/>
-              </a:rPr>
-              <a:t>energy</a:t>
-            </a:r>
-            <a:r>
-              <a:rPr lang="en-US" sz="1200" kern="1200" dirty="0" smtClean="0">
-                <a:solidFill>
-                  <a:schemeClr val="tx1"/>
-                </a:solidFill>
-                <a:effectLst/>
-                <a:latin typeface="+mn-lt"/>
-                <a:ea typeface="+mn-ea"/>
-                <a:cs typeface="+mn-cs"/>
-              </a:rPr>
-              <a:t> and </a:t>
-            </a:r>
-            <a:r>
-              <a:rPr lang="en-US" sz="1200" b="1" kern="1200" dirty="0" err="1" smtClean="0">
-                <a:solidFill>
-                  <a:schemeClr val="tx1"/>
-                </a:solidFill>
-                <a:effectLst/>
-                <a:latin typeface="+mn-lt"/>
-                <a:ea typeface="+mn-ea"/>
-                <a:cs typeface="+mn-cs"/>
-              </a:rPr>
-              <a:t>sample_id</a:t>
-            </a:r>
-            <a:r>
-              <a:rPr lang="en-US" sz="1200" kern="1200" dirty="0" smtClean="0">
-                <a:solidFill>
-                  <a:schemeClr val="tx1"/>
-                </a:solidFill>
-                <a:effectLst/>
-                <a:latin typeface="+mn-lt"/>
-                <a:ea typeface="+mn-ea"/>
-                <a:cs typeface="+mn-cs"/>
-              </a:rPr>
-              <a:t> in the expanded URI template for the output. Extract the value of </a:t>
-            </a:r>
-            <a:r>
-              <a:rPr lang="en-US" sz="1200" b="1" kern="1200" dirty="0" smtClean="0">
-                <a:solidFill>
-                  <a:schemeClr val="tx1"/>
-                </a:solidFill>
-                <a:effectLst/>
-                <a:latin typeface="+mn-lt"/>
-                <a:ea typeface="+mn-ea"/>
-                <a:cs typeface="+mn-cs"/>
-              </a:rPr>
-              <a:t>energy</a:t>
-            </a:r>
-            <a:r>
-              <a:rPr lang="en-US" sz="1200" kern="1200" dirty="0" smtClean="0">
-                <a:solidFill>
-                  <a:schemeClr val="tx1"/>
-                </a:solidFill>
-                <a:effectLst/>
-                <a:latin typeface="+mn-lt"/>
-                <a:ea typeface="+mn-ea"/>
-                <a:cs typeface="+mn-cs"/>
-              </a:rPr>
-              <a:t> from each such path for which </a:t>
-            </a:r>
-            <a:r>
-              <a:rPr lang="en-US" sz="1200" b="1" kern="1200" dirty="0" err="1" smtClean="0">
-                <a:solidFill>
-                  <a:schemeClr val="tx1"/>
-                </a:solidFill>
-                <a:effectLst/>
-                <a:latin typeface="+mn-lt"/>
-                <a:ea typeface="+mn-ea"/>
-                <a:cs typeface="+mn-cs"/>
-              </a:rPr>
-              <a:t>sample_id</a:t>
-            </a:r>
-            <a:r>
-              <a:rPr lang="en-US" sz="1200" kern="1200" dirty="0" smtClean="0">
-                <a:solidFill>
-                  <a:schemeClr val="tx1"/>
-                </a:solidFill>
-                <a:effectLst/>
-                <a:latin typeface="+mn-lt"/>
-                <a:ea typeface="+mn-ea"/>
-                <a:cs typeface="+mn-cs"/>
-              </a:rPr>
-              <a:t> equals </a:t>
-            </a:r>
-            <a:r>
-              <a:rPr lang="en-US" sz="1200" b="1" kern="1200" dirty="0" smtClean="0">
-                <a:solidFill>
-                  <a:schemeClr val="tx1"/>
-                </a:solidFill>
-                <a:effectLst/>
-                <a:latin typeface="+mn-lt"/>
-                <a:ea typeface="+mn-ea"/>
-                <a:cs typeface="+mn-cs"/>
-              </a:rPr>
-              <a:t>DRT322.</a:t>
+              <a:t> </a:t>
             </a:r>
             <a:endParaRPr lang="en-US" dirty="0" smtClean="0"/>
           </a:p>
@@ -1143,7 +865,7 @@
           <a:p>
             <a:fld id="{B9A15983-6E63-4C4D-8817-F3F7EA95B8AD}" type="slidenum">
               <a:rPr lang="en-US" smtClean="0"/>
-              <a:t>3</a:t>
+              <a:t>2</a:t>
             </a:fld>
             <a:endParaRPr lang="en-US"/>
           </a:p>
@@ -1206,53 +928,6 @@
           <a:bodyPr/>
           <a:lstStyle/>
           <a:p>
-            <a:r>
-              <a:rPr lang="en-US" i="0" dirty="0" smtClean="0"/>
-              <a:t>Query</a:t>
-            </a:r>
-            <a:r>
-              <a:rPr lang="en-US" i="0" baseline="0" dirty="0" smtClean="0"/>
-              <a:t> 3:  </a:t>
-            </a:r>
-            <a:r>
-              <a:rPr lang="en-US" sz="1200" b="1" i="0" kern="1200" dirty="0" smtClean="0">
-                <a:solidFill>
-                  <a:schemeClr val="tx1"/>
-                </a:solidFill>
-                <a:effectLst/>
-                <a:latin typeface="+mn-lt"/>
-                <a:ea typeface="+mn-ea"/>
-                <a:cs typeface="+mn-cs"/>
-              </a:rPr>
-              <a:t>Where is the raw image </a:t>
-            </a:r>
-            <a:r>
-              <a:rPr lang="en-US" sz="1200" b="0" i="0" kern="1200" dirty="0" smtClean="0">
-                <a:solidFill>
-                  <a:schemeClr val="tx1"/>
-                </a:solidFill>
-                <a:effectLst/>
-                <a:latin typeface="+mn-lt"/>
-                <a:ea typeface="+mn-ea"/>
-                <a:cs typeface="+mn-cs"/>
-              </a:rPr>
-              <a:t>corresponding to corrected image </a:t>
-            </a:r>
-            <a:r>
-              <a:rPr lang="en-US" sz="1200" b="1" i="0" kern="1200" dirty="0" smtClean="0">
-                <a:solidFill>
-                  <a:schemeClr val="tx1"/>
-                </a:solidFill>
-                <a:effectLst/>
-                <a:latin typeface="+mn-lt"/>
-                <a:ea typeface="+mn-ea"/>
-                <a:cs typeface="+mn-cs"/>
-              </a:rPr>
-              <a:t>DRT322_11000ev_028.img </a:t>
-            </a:r>
-            <a:endParaRPr lang="en-US" b="1" i="0" dirty="0" smtClean="0"/>
-          </a:p>
-          <a:p>
             <a:pPr marL="0" marR="0" indent="0" algn="l" defTabSz="457200" rtl="0" eaLnBrk="1" fontAlgn="auto" latinLnBrk="0" hangingPunct="1">
               <a:lnSpc>
                 <a:spcPct val="100000"/>
@@ -1271,11 +946,19 @@
               <a:defRPr/>
             </a:pPr>
             <a:r>
+              <a:rPr lang="en-US" dirty="0" smtClean="0"/>
+              <a:t>Query</a:t>
+            </a:r>
+            <a:r>
               <a:rPr lang="en-US" baseline="0" dirty="0" smtClean="0"/>
-              <a:t>Scientist:  L</a:t>
-            </a:r>
-            <a:r>
-              <a:rPr lang="en-US" sz="1200" kern="1200" dirty="0" smtClean="0">
+              <a:t> 2</a:t>
+            </a:r>
+            <a:r>
+              <a:rPr lang="en-US" i="0" baseline="0" dirty="0" smtClean="0"/>
+              <a:t>:  </a:t>
+            </a:r>
+            <a:r>
+              <a:rPr lang="en-US" sz="1200" b="1" i="0" kern="1200" dirty="0" smtClean="0">
                 <a:solidFill>
                   <a:schemeClr val="tx1"/>
                 </a:solidFill>
@@ -1284,10 +967,10 @@
                 <a:ea typeface="+mn-ea"/>
                 <a:cs typeface="+mn-cs"/>
               </a:rPr>
-              <a:t>ook at the image files nested within the </a:t>
-            </a:r>
-            <a:r>
-              <a:rPr lang="en-US" sz="1200" b="1" kern="1200" dirty="0" smtClean="0">
+              <a:t>What energies </a:t>
+            </a:r>
+            <a:r>
+              <a:rPr lang="en-US" sz="1200" b="0" i="0" kern="1200" dirty="0" smtClean="0">
                 <a:solidFill>
                   <a:schemeClr val="tx1"/>
                 </a:solidFill>
@@ -1296,10 +979,10 @@
                 <a:ea typeface="+mn-ea"/>
                 <a:cs typeface="+mn-cs"/>
               </a:rPr>
-              <a:t>raw</a:t>
-            </a:r>
-            <a:r>
-              <a:rPr lang="en-US" sz="1200" kern="1200" dirty="0" smtClean="0">
+              <a:t>were used during </a:t>
+            </a:r>
+            <a:r>
+              <a:rPr lang="en-US" sz="1200" b="1" i="0" kern="1200" dirty="0" smtClean="0">
                 <a:solidFill>
                   <a:schemeClr val="tx1"/>
                 </a:solidFill>
@@ -1308,10 +991,10 @@
                 <a:ea typeface="+mn-ea"/>
                 <a:cs typeface="+mn-cs"/>
               </a:rPr>
-              <a:t> directory. Find the image file that contains the values </a:t>
-            </a:r>
-            <a:r>
-              <a:rPr lang="en-US" sz="1200" b="1" kern="1200" dirty="0" smtClean="0">
+              <a:t>collection</a:t>
+            </a:r>
+            <a:r>
+              <a:rPr lang="en-US" sz="1200" b="0" i="0" kern="1200" dirty="0" smtClean="0">
                 <a:solidFill>
                   <a:schemeClr val="tx1"/>
                 </a:solidFill>
@@ -1320,10 +1003,10 @@
                 <a:ea typeface="+mn-ea"/>
                 <a:cs typeface="+mn-cs"/>
               </a:rPr>
-              <a:t>DRT322</a:t>
-            </a:r>
-            <a:r>
-              <a:rPr lang="en-US" sz="1200" kern="1200" dirty="0" smtClean="0">
+              <a:t> of images from sample </a:t>
+            </a:r>
+            <a:r>
+              <a:rPr lang="en-US" sz="1200" b="1" i="0" kern="1200" dirty="0" smtClean="0">
                 <a:solidFill>
                   <a:schemeClr val="tx1"/>
                 </a:solidFill>
@@ -1332,10 +1015,10 @@
                 <a:ea typeface="+mn-ea"/>
                 <a:cs typeface="+mn-cs"/>
               </a:rPr>
-              <a:t>, </a:t>
-            </a:r>
-            <a:r>
-              <a:rPr lang="en-US" sz="1200" b="1" kern="1200" dirty="0" smtClean="0">
+              <a:t>DRT322</a:t>
+            </a:r>
+            <a:r>
+              <a:rPr lang="en-US" sz="1200" b="0" i="0" kern="1200" dirty="0" smtClean="0">
                 <a:solidFill>
                   <a:schemeClr val="tx1"/>
                 </a:solidFill>
@@ -1344,7 +1027,14 @@
                 <a:ea typeface="+mn-ea"/>
                 <a:cs typeface="+mn-cs"/>
               </a:rPr>
-              <a:t>11000</a:t>
+              <a:t>?</a:t>
+            </a:r>
+            <a:endParaRPr lang="en-US" baseline="0" dirty="0" smtClean="0"/>
+          </a:p>
+          <a:p>
+            <a:r>
+              <a:rPr lang="en-US" baseline="0" dirty="0" smtClean="0"/>
+              <a:t>Scientist:  L</a:t>
             </a:r>
             <a:r>
               <a:rPr lang="en-US" sz="1200" kern="1200" dirty="0" smtClean="0">
@@ -1356,7 +1046,7 @@
                 <a:ea typeface="+mn-ea"/>
                 <a:cs typeface="+mn-cs"/>
               </a:rPr>
-              <a:t>, and </a:t>
+              <a:t>ook at the contents of the run/raw/q55/</a:t>
             </a:r>
             <a:r>
               <a:rPr lang="en-US" sz="1200" b="1" kern="1200" dirty="0" smtClean="0">
@@ -1368,7 +1058,7 @@
                 <a:ea typeface="+mn-ea"/>
                 <a:cs typeface="+mn-cs"/>
               </a:rPr>
-              <a:t>028</a:t>
+              <a:t>DRT322</a:t>
             </a:r>
             <a:r>
               <a:rPr lang="en-US" sz="1200" kern="1200" dirty="0" smtClean="0">
@@ -1380,11 +1070,28 @@
                 <a:ea typeface="+mn-ea"/>
                 <a:cs typeface="+mn-cs"/>
               </a:rPr>
-              <a:t> in the file access path.</a:t>
+              <a:t> directory. The names of subdirectories indicate the values of the energies.</a:t>
             </a:r>
             <a:endParaRPr lang="en-US" dirty="0" smtClean="0"/>
           </a:p>
           <a:p>
+            <a:pPr marL="0" marR="0" indent="0" algn="l" defTabSz="457200" rtl="0" eaLnBrk="1" fontAlgn="auto" latinLnBrk="0" hangingPunct="1">
+              <a:lnSpc>
+                <a:spcPct val="100000"/>
+              </a:lnSpc>
+              <a:spcBef>
+                <a:spcPts val="0"/>
+              </a:spcBef>
+              <a:spcAft>
+                <a:spcPts val="0"/>
+              </a:spcAft>
+              <a:buClrTx/>
+              <a:buSzTx/>
+              <a:buFontTx/>
+              <a:buNone/>
+              <a:tabLst/>
+              <a:defRPr/>
+            </a:pPr>
             <a:r>
               <a:rPr lang="en-US" sz="1200" kern="1200" dirty="0" smtClean="0">
                 <a:solidFill>
@@ -1395,10 +1102,10 @@
                 <a:ea typeface="+mn-ea"/>
                 <a:cs typeface="+mn-cs"/>
               </a:rPr>
-              <a:t>YW: Extract the URI template variable names and values from the path to </a:t>
-            </a:r>
-            <a:r>
-              <a:rPr lang="en-US" sz="1200" b="1" kern="1200" dirty="0" smtClean="0">
+              <a:t>YW: look for all persisted outputs of </a:t>
+            </a:r>
+            <a:r>
+              <a:rPr lang="en-US" sz="1200" b="1" kern="1200" dirty="0" err="1" smtClean="0">
                 <a:solidFill>
                   <a:schemeClr val="tx1"/>
                 </a:solidFill>
@@ -1407,7 +1114,7 @@
                 <a:ea typeface="+mn-ea"/>
                 <a:cs typeface="+mn-cs"/>
               </a:rPr>
-              <a:t>DRT322_11000ev_028.img</a:t>
+              <a:t>collect_data_set</a:t>
             </a:r>
             <a:r>
               <a:rPr lang="en-US" sz="1200" kern="1200" dirty="0" smtClean="0">
@@ -1419,10 +1126,10 @@
                 <a:ea typeface="+mn-ea"/>
                 <a:cs typeface="+mn-cs"/>
               </a:rPr>
-              <a:t> output by the port named </a:t>
-            </a:r>
-            <a:r>
-              <a:rPr lang="en-US" sz="1200" b="1" kern="1200" dirty="0" err="1" smtClean="0">
+              <a:t> that include both </a:t>
+            </a:r>
+            <a:r>
+              <a:rPr lang="en-US" sz="1200" b="1" kern="1200" dirty="0" smtClean="0">
                 <a:solidFill>
                   <a:schemeClr val="tx1"/>
                 </a:solidFill>
@@ -1431,7 +1138,7 @@
                 <a:ea typeface="+mn-ea"/>
                 <a:cs typeface="+mn-cs"/>
               </a:rPr>
-              <a:t>corrected_image</a:t>
+              <a:t>energy</a:t>
             </a:r>
             <a:r>
               <a:rPr lang="en-US" sz="1200" kern="1200" dirty="0" smtClean="0">
@@ -1443,7 +1150,7 @@
                 <a:ea typeface="+mn-ea"/>
                 <a:cs typeface="+mn-cs"/>
               </a:rPr>
-              <a:t>, look at the paths for all files output by the </a:t>
+              <a:t> and </a:t>
             </a:r>
             <a:r>
               <a:rPr lang="en-US" sz="1200" b="1" kern="1200" dirty="0" err="1" smtClean="0">
@@ -1455,7 +1162,7 @@
                 <a:ea typeface="+mn-ea"/>
                 <a:cs typeface="+mn-cs"/>
               </a:rPr>
-              <a:t>raw_image</a:t>
+              <a:t>sample_id</a:t>
             </a:r>
             <a:r>
               <a:rPr lang="en-US" sz="1200" kern="1200" dirty="0" smtClean="0">
@@ -1467,7 +1174,67 @@
                 <a:ea typeface="+mn-ea"/>
                 <a:cs typeface="+mn-cs"/>
               </a:rPr>
-              <a:t> port, and return the file whose path includes template variables with names and values matching those for DRT322_11000ev_028.img </a:t>
+              <a:t> in the expanded URI template for the output. Extract the value of </a:t>
+            </a:r>
+            <a:r>
+              <a:rPr lang="en-US" sz="1200" b="1" kern="1200" dirty="0" smtClean="0">
+                <a:solidFill>
+                  <a:schemeClr val="tx1"/>
+                </a:solidFill>
+                <a:effectLst/>
+                <a:latin typeface="+mn-lt"/>
+                <a:ea typeface="+mn-ea"/>
+                <a:cs typeface="+mn-cs"/>
+              </a:rPr>
+              <a:t>energy</a:t>
+            </a:r>
+            <a:r>
+              <a:rPr lang="en-US" sz="1200" kern="1200" dirty="0" smtClean="0">
+                <a:solidFill>
+                  <a:schemeClr val="tx1"/>
+                </a:solidFill>
+                <a:effectLst/>
+                <a:latin typeface="+mn-lt"/>
+                <a:ea typeface="+mn-ea"/>
+                <a:cs typeface="+mn-cs"/>
+              </a:rPr>
+              <a:t> from each such path for which </a:t>
+            </a:r>
+            <a:r>
+              <a:rPr lang="en-US" sz="1200" b="1" kern="1200" dirty="0" err="1" smtClean="0">
+                <a:solidFill>
+                  <a:schemeClr val="tx1"/>
+                </a:solidFill>
+                <a:effectLst/>
+                <a:latin typeface="+mn-lt"/>
+                <a:ea typeface="+mn-ea"/>
+                <a:cs typeface="+mn-cs"/>
+              </a:rPr>
+              <a:t>sample_id</a:t>
+            </a:r>
+            <a:r>
+              <a:rPr lang="en-US" sz="1200" kern="1200" dirty="0" smtClean="0">
+                <a:solidFill>
+                  <a:schemeClr val="tx1"/>
+                </a:solidFill>
+                <a:effectLst/>
+                <a:latin typeface="+mn-lt"/>
+                <a:ea typeface="+mn-ea"/>
+                <a:cs typeface="+mn-cs"/>
+              </a:rPr>
+              <a:t> equals </a:t>
+            </a:r>
+            <a:r>
+              <a:rPr lang="en-US" sz="1200" b="1" kern="1200" dirty="0" smtClean="0">
+                <a:solidFill>
+                  <a:schemeClr val="tx1"/>
+                </a:solidFill>
+                <a:effectLst/>
+                <a:latin typeface="+mn-lt"/>
+                <a:ea typeface="+mn-ea"/>
+                <a:cs typeface="+mn-cs"/>
+              </a:rPr>
+              <a:t>DRT322.</a:t>
             </a:r>
             <a:endParaRPr lang="en-US" dirty="0" smtClean="0"/>
           </a:p>
@@ -1494,7 +1261,7 @@
           <a:p>
             <a:fld id="{B9A15983-6E63-4C4D-8817-F3F7EA95B8AD}" type="slidenum">
               <a:rPr lang="en-US" smtClean="0"/>
-              <a:t>4</a:t>
+              <a:t>3</a:t>
             </a:fld>
             <a:endParaRPr lang="en-US"/>
           </a:p>
@@ -1514,6 +1281,357 @@
 </file>
 
 <file path=ppt/notesSlides/notesSlide4.xml><?xml version="1.0" encoding="utf-8"?>
+<p:notes xmlns:a="http://schemas.openxmlformats.org/drawingml/2006/main" xmlns:r="http://schemas.openxmlformats.org/officeDocument/2006/relationships" xmlns:p="http://schemas.openxmlformats.org/presentationml/2006/main">
+  <p:cSld>
+    <p:spTree>
+      <p:nvGrpSpPr>
+        <p:cNvPr id="1" name=""/>
+        <p:cNvGrpSpPr/>
+        <p:nvPr/>
+      </p:nvGrpSpPr>
+      <p:grpSpPr>
+        <a:xfrm>
+          <a:off x="0" y="0"/>
+          <a:ext cx="0" cy="0"/>
+          <a:chOff x="0" y="0"/>
+          <a:chExt cx="0" cy="0"/>
+        </a:xfrm>
+      </p:grpSpPr>
+      <p:sp>
+        <p:nvSpPr>
+          <p:cNvPr id="2" name="Slide Image Placeholder 1"/>
+          <p:cNvSpPr>
+            <a:spLocks noGrp="1" noRot="1" noChangeAspect="1"/>
+          </p:cNvSpPr>
+          <p:nvPr>
+            <p:ph type="sldImg"/>
+          </p:nvPr>
+        </p:nvSpPr>
+        <p:spPr/>
+      </p:sp>
+      <p:sp>
+        <p:nvSpPr>
+          <p:cNvPr id="3" name="Notes Placeholder 2"/>
+          <p:cNvSpPr>
+            <a:spLocks noGrp="1"/>
+          </p:cNvSpPr>
+          <p:nvPr>
+            <p:ph type="body" idx="1"/>
+          </p:nvPr>
+        </p:nvSpPr>
+        <p:spPr/>
+        <p:txBody>
+          <a:bodyPr/>
+          <a:lstStyle/>
+          <a:p>
+            <a:r>
+              <a:rPr lang="en-US" i="0" dirty="0" smtClean="0"/>
+              <a:t>Query</a:t>
+            </a:r>
+            <a:r>
+              <a:rPr lang="en-US" i="0" baseline="0" dirty="0" smtClean="0"/>
+              <a:t> 3:  </a:t>
+            </a:r>
+            <a:r>
+              <a:rPr lang="en-US" sz="1200" b="1" i="0" kern="1200" dirty="0" smtClean="0">
+                <a:solidFill>
+                  <a:schemeClr val="tx1"/>
+                </a:solidFill>
+                <a:effectLst/>
+                <a:latin typeface="+mn-lt"/>
+                <a:ea typeface="+mn-ea"/>
+                <a:cs typeface="+mn-cs"/>
+              </a:rPr>
+              <a:t>Where is the raw image </a:t>
+            </a:r>
+            <a:r>
+              <a:rPr lang="en-US" sz="1200" b="0" i="0" kern="1200" dirty="0" smtClean="0">
+                <a:solidFill>
+                  <a:schemeClr val="tx1"/>
+                </a:solidFill>
+                <a:effectLst/>
+                <a:latin typeface="+mn-lt"/>
+                <a:ea typeface="+mn-ea"/>
+                <a:cs typeface="+mn-cs"/>
+              </a:rPr>
+              <a:t>corresponding to corrected image </a:t>
+            </a:r>
+            <a:r>
+              <a:rPr lang="en-US" sz="1200" b="1" i="0" kern="1200" dirty="0" smtClean="0">
+                <a:solidFill>
+                  <a:schemeClr val="tx1"/>
+                </a:solidFill>
+                <a:effectLst/>
+                <a:latin typeface="+mn-lt"/>
+                <a:ea typeface="+mn-ea"/>
+                <a:cs typeface="+mn-cs"/>
+              </a:rPr>
+              <a:t>DRT322_11000ev_028.img </a:t>
+            </a:r>
+            <a:endParaRPr lang="en-US" b="1" i="0" dirty="0" smtClean="0"/>
+          </a:p>
+          <a:p>
+            <a:pPr marL="0" marR="0" indent="0" algn="l" defTabSz="457200" rtl="0" eaLnBrk="1" fontAlgn="auto" latinLnBrk="0" hangingPunct="1">
+              <a:lnSpc>
+                <a:spcPct val="100000"/>
+              </a:lnSpc>
+              <a:spcBef>
+                <a:spcPts val="0"/>
+              </a:spcBef>
+              <a:spcAft>
+                <a:spcPts val="0"/>
+              </a:spcAft>
+              <a:buClrTx/>
+              <a:buSzTx/>
+              <a:buFontTx/>
+              <a:buNone/>
+              <a:tabLst/>
+              <a:defRPr/>
+            </a:pPr>
+            <a:r>
+              <a:rPr lang="en-US" baseline="0" dirty="0" smtClean="0"/>
+              <a:t>Scientist:  L</a:t>
+            </a:r>
+            <a:r>
+              <a:rPr lang="en-US" sz="1200" kern="1200" dirty="0" smtClean="0">
+                <a:solidFill>
+                  <a:schemeClr val="tx1"/>
+                </a:solidFill>
+                <a:effectLst/>
+                <a:latin typeface="+mn-lt"/>
+                <a:ea typeface="+mn-ea"/>
+                <a:cs typeface="+mn-cs"/>
+              </a:rPr>
+              <a:t>ook at the image files nested within the </a:t>
+            </a:r>
+            <a:r>
+              <a:rPr lang="en-US" sz="1200" b="1" kern="1200" dirty="0" smtClean="0">
+                <a:solidFill>
+                  <a:schemeClr val="tx1"/>
+                </a:solidFill>
+                <a:effectLst/>
+                <a:latin typeface="+mn-lt"/>
+                <a:ea typeface="+mn-ea"/>
+                <a:cs typeface="+mn-cs"/>
+              </a:rPr>
+              <a:t>raw</a:t>
+            </a:r>
+            <a:r>
+              <a:rPr lang="en-US" sz="1200" kern="1200" dirty="0" smtClean="0">
+                <a:solidFill>
+                  <a:schemeClr val="tx1"/>
+                </a:solidFill>
+                <a:effectLst/>
+                <a:latin typeface="+mn-lt"/>
+                <a:ea typeface="+mn-ea"/>
+                <a:cs typeface="+mn-cs"/>
+              </a:rPr>
+              <a:t> directory. Find the image file that contains the values </a:t>
+            </a:r>
+            <a:r>
+              <a:rPr lang="en-US" sz="1200" b="1" kern="1200" dirty="0" smtClean="0">
+                <a:solidFill>
+                  <a:schemeClr val="tx1"/>
+                </a:solidFill>
+                <a:effectLst/>
+                <a:latin typeface="+mn-lt"/>
+                <a:ea typeface="+mn-ea"/>
+                <a:cs typeface="+mn-cs"/>
+              </a:rPr>
+              <a:t>DRT322</a:t>
+            </a:r>
+            <a:r>
+              <a:rPr lang="en-US" sz="1200" kern="1200" dirty="0" smtClean="0">
+                <a:solidFill>
+                  <a:schemeClr val="tx1"/>
+                </a:solidFill>
+                <a:effectLst/>
+                <a:latin typeface="+mn-lt"/>
+                <a:ea typeface="+mn-ea"/>
+                <a:cs typeface="+mn-cs"/>
+              </a:rPr>
+              <a:t>, </a:t>
+            </a:r>
+            <a:r>
+              <a:rPr lang="en-US" sz="1200" b="1" kern="1200" dirty="0" smtClean="0">
+                <a:solidFill>
+                  <a:schemeClr val="tx1"/>
+                </a:solidFill>
+                <a:effectLst/>
+                <a:latin typeface="+mn-lt"/>
+                <a:ea typeface="+mn-ea"/>
+                <a:cs typeface="+mn-cs"/>
+              </a:rPr>
+              <a:t>11000</a:t>
+            </a:r>
+            <a:r>
+              <a:rPr lang="en-US" sz="1200" kern="1200" dirty="0" smtClean="0">
+                <a:solidFill>
+                  <a:schemeClr val="tx1"/>
+                </a:solidFill>
+                <a:effectLst/>
+                <a:latin typeface="+mn-lt"/>
+                <a:ea typeface="+mn-ea"/>
+                <a:cs typeface="+mn-cs"/>
+              </a:rPr>
+              <a:t>, and </a:t>
+            </a:r>
+            <a:r>
+              <a:rPr lang="en-US" sz="1200" b="1" kern="1200" dirty="0" smtClean="0">
+                <a:solidFill>
+                  <a:schemeClr val="tx1"/>
+                </a:solidFill>
+                <a:effectLst/>
+                <a:latin typeface="+mn-lt"/>
+                <a:ea typeface="+mn-ea"/>
+                <a:cs typeface="+mn-cs"/>
+              </a:rPr>
+              <a:t>028</a:t>
+            </a:r>
+            <a:r>
+              <a:rPr lang="en-US" sz="1200" kern="1200" dirty="0" smtClean="0">
+                <a:solidFill>
+                  <a:schemeClr val="tx1"/>
+                </a:solidFill>
+                <a:effectLst/>
+                <a:latin typeface="+mn-lt"/>
+                <a:ea typeface="+mn-ea"/>
+                <a:cs typeface="+mn-cs"/>
+              </a:rPr>
+              <a:t> in the file access path.</a:t>
+            </a:r>
+            <a:endParaRPr lang="en-US" dirty="0" smtClean="0"/>
+          </a:p>
+          <a:p>
+            <a:r>
+              <a:rPr lang="en-US" sz="1200" kern="1200" dirty="0" smtClean="0">
+                <a:solidFill>
+                  <a:schemeClr val="tx1"/>
+                </a:solidFill>
+                <a:effectLst/>
+                <a:latin typeface="+mn-lt"/>
+                <a:ea typeface="+mn-ea"/>
+                <a:cs typeface="+mn-cs"/>
+              </a:rPr>
+              <a:t>YW: Extract the URI template variable names and values from the path to </a:t>
+            </a:r>
+            <a:r>
+              <a:rPr lang="en-US" sz="1200" b="1" kern="1200" dirty="0" smtClean="0">
+                <a:solidFill>
+                  <a:schemeClr val="tx1"/>
+                </a:solidFill>
+                <a:effectLst/>
+                <a:latin typeface="+mn-lt"/>
+                <a:ea typeface="+mn-ea"/>
+                <a:cs typeface="+mn-cs"/>
+              </a:rPr>
+              <a:t>DRT322_11000ev_028.img</a:t>
+            </a:r>
+            <a:r>
+              <a:rPr lang="en-US" sz="1200" kern="1200" dirty="0" smtClean="0">
+                <a:solidFill>
+                  <a:schemeClr val="tx1"/>
+                </a:solidFill>
+                <a:effectLst/>
+                <a:latin typeface="+mn-lt"/>
+                <a:ea typeface="+mn-ea"/>
+                <a:cs typeface="+mn-cs"/>
+              </a:rPr>
+              <a:t> output by the port named </a:t>
+            </a:r>
+            <a:r>
+              <a:rPr lang="en-US" sz="1200" b="1" kern="1200" dirty="0" err="1" smtClean="0">
+                <a:solidFill>
+                  <a:schemeClr val="tx1"/>
+                </a:solidFill>
+                <a:effectLst/>
+                <a:latin typeface="+mn-lt"/>
+                <a:ea typeface="+mn-ea"/>
+                <a:cs typeface="+mn-cs"/>
+              </a:rPr>
+              <a:t>corrected_image</a:t>
+            </a:r>
+            <a:r>
+              <a:rPr lang="en-US" sz="1200" kern="1200" dirty="0" smtClean="0">
+                <a:solidFill>
+                  <a:schemeClr val="tx1"/>
+                </a:solidFill>
+                <a:effectLst/>
+                <a:latin typeface="+mn-lt"/>
+                <a:ea typeface="+mn-ea"/>
+                <a:cs typeface="+mn-cs"/>
+              </a:rPr>
+              <a:t>, look at the paths for all files output by the </a:t>
+            </a:r>
+            <a:r>
+              <a:rPr lang="en-US" sz="1200" b="1" kern="1200" dirty="0" err="1" smtClean="0">
+                <a:solidFill>
+                  <a:schemeClr val="tx1"/>
+                </a:solidFill>
+                <a:effectLst/>
+                <a:latin typeface="+mn-lt"/>
+                <a:ea typeface="+mn-ea"/>
+                <a:cs typeface="+mn-cs"/>
+              </a:rPr>
+              <a:t>raw_image</a:t>
+            </a:r>
+            <a:r>
+              <a:rPr lang="en-US" sz="1200" kern="1200" dirty="0" smtClean="0">
+                <a:solidFill>
+                  <a:schemeClr val="tx1"/>
+                </a:solidFill>
+                <a:effectLst/>
+                <a:latin typeface="+mn-lt"/>
+                <a:ea typeface="+mn-ea"/>
+                <a:cs typeface="+mn-cs"/>
+              </a:rPr>
+              <a:t> port, and return the file whose path includes template variables with names and values matching those for DRT322_11000ev_028.img </a:t>
+            </a:r>
+            <a:endParaRPr lang="en-US" dirty="0" smtClean="0"/>
+          </a:p>
+          <a:p>
+            <a:pPr algn="l"/>
+            <a:endParaRPr lang="en-US" dirty="0"/>
+          </a:p>
+        </p:txBody>
+      </p:sp>
+      <p:sp>
+        <p:nvSpPr>
+          <p:cNvPr id="4" name="Slide Number Placeholder 3"/>
+          <p:cNvSpPr>
+            <a:spLocks noGrp="1"/>
+          </p:cNvSpPr>
+          <p:nvPr>
+            <p:ph type="sldNum" sz="quarter" idx="10"/>
+          </p:nvPr>
+        </p:nvSpPr>
+        <p:spPr/>
+        <p:txBody>
+          <a:bodyPr/>
+          <a:lstStyle/>
+          <a:p>
+            <a:fld id="{B9A15983-6E63-4C4D-8817-F3F7EA95B8AD}" type="slidenum">
+              <a:rPr lang="en-US" smtClean="0"/>
+              <a:t>4</a:t>
+            </a:fld>
+            <a:endParaRPr lang="en-US"/>
+          </a:p>
+        </p:txBody>
+      </p:sp>
+    </p:spTree>
+    <p:extLst>
+      <p:ext uri="{BB962C8B-B14F-4D97-AF65-F5344CB8AC3E}">
+        <p14:creationId xmlns:p14="http://schemas.microsoft.com/office/powerpoint/2010/main" val="1022435978"/>
+      </p:ext>
+    </p:extLst>
+  </p:cSld>
+  <p:clrMapOvr>
+    <a:masterClrMapping/>
+  </p:clrMapOvr>
+</p:notes>
+</file>
+
+<file path=ppt/notesSlides/notesSlide5.xml><?xml version="1.0" encoding="utf-8"?>
 <p:notes xmlns:a="http://schemas.openxmlformats.org/drawingml/2006/main" xmlns:r="http://schemas.openxmlformats.org/officeDocument/2006/relationships" xmlns:p="http://schemas.openxmlformats.org/presentationml/2006/main">
   <p:cSld>
     <p:spTree>
@@ -4800,7 +4918,7 @@
           <p:nvPr/>
         </p:nvPicPr>
         <p:blipFill>
-          <a:blip r:embed="rId2">
+          <a:blip r:embed="rId3">
             <a:extLst>
               <a:ext uri="{28A0092B-C50C-407E-A947-70E740481C1C}">
                 <a14:useLocalDpi xmlns:a14="http://schemas.microsoft.com/office/drawing/2010/main" val="0"/>
@@ -4830,7 +4948,7 @@
           <p:nvPr/>
         </p:nvPicPr>
         <p:blipFill>
-          <a:blip r:embed="rId3">
+          <a:blip r:embed="rId4">
             <a:extLst>
               <a:ext uri="{28A0092B-C50C-407E-A947-70E740481C1C}">
                 <a14:useLocalDpi xmlns:a14="http://schemas.microsoft.com/office/drawing/2010/main" val="0"/>

</xml_diff>